<commit_message>
Weiter an der Präsentation gearbeitet
Habe alles zur Struktur in die Präsentation eingebracht.
Und ein weiteres GitIgnore für Sicherheitsspeicherungen von Visio und
PowerPoint zugefügt.
</commit_message>
<xml_diff>
--- a/GesundheitsamtPraes.pptx
+++ b/GesundheitsamtPraes.pptx
@@ -5,13 +5,18 @@
     <p:sldMasterId id="2147483685" r:id="rId1"/>
   </p:sldMasterIdLst>
   <p:notesMasterIdLst>
-    <p:notesMasterId r:id="rId6"/>
+    <p:notesMasterId r:id="rId11"/>
   </p:notesMasterIdLst>
   <p:sldIdLst>
     <p:sldId id="256" r:id="rId2"/>
     <p:sldId id="257" r:id="rId3"/>
     <p:sldId id="258" r:id="rId4"/>
     <p:sldId id="259" r:id="rId5"/>
+    <p:sldId id="260" r:id="rId6"/>
+    <p:sldId id="261" r:id="rId7"/>
+    <p:sldId id="262" r:id="rId8"/>
+    <p:sldId id="263" r:id="rId9"/>
+    <p:sldId id="264" r:id="rId10"/>
   </p:sldIdLst>
   <p:sldSz cx="12192000" cy="6858000"/>
   <p:notesSz cx="6858000" cy="9144000"/>
@@ -112,7 +117,7 @@
   </p:defaultTextStyle>
   <p:extLst>
     <p:ext uri="{EFAFB233-063F-42B5-8137-9DF3F51BA10A}">
-      <p15:sldGuideLst xmlns="" xmlns:p15="http://schemas.microsoft.com/office/powerpoint/2012/main"/>
+      <p15:sldGuideLst xmlns:p15="http://schemas.microsoft.com/office/powerpoint/2012/main" xmlns=""/>
     </p:ext>
   </p:extLst>
 </p:presentation>
@@ -200,7 +205,7 @@
           <a:p>
             <a:fld id="{FD0E5214-A780-45B3-8C91-E131831524A4}" type="datetimeFigureOut">
               <a:rPr lang="de-DE" smtClean="0"/>
-              <a:t>15.03.2015</a:t>
+              <a:t>16.03.2015</a:t>
             </a:fld>
             <a:endParaRPr lang="de-DE"/>
           </a:p>
@@ -1274,7 +1279,7 @@
           <a:p>
             <a:fld id="{430DCDF4-4212-41DE-881A-86CC5F4C4960}" type="datetime1">
               <a:rPr lang="en-US" smtClean="0"/>
-              <a:t>3/15/2015</a:t>
+              <a:t>3/16/2015</a:t>
             </a:fld>
             <a:endParaRPr lang="en-US" dirty="0"/>
           </a:p>
@@ -1553,7 +1558,7 @@
           <a:p>
             <a:fld id="{7D7F22C2-E00C-402C-9237-97B2DDDB1C1E}" type="datetime1">
               <a:rPr lang="en-US" smtClean="0"/>
-              <a:t>3/15/2015</a:t>
+              <a:t>3/16/2015</a:t>
             </a:fld>
             <a:endParaRPr lang="en-US" dirty="0"/>
           </a:p>
@@ -1848,7 +1853,7 @@
           <a:p>
             <a:fld id="{4751C775-F499-41CA-BB69-5F0CE1DC728B}" type="datetime1">
               <a:rPr lang="en-US" smtClean="0"/>
-              <a:t>3/15/2015</a:t>
+              <a:t>3/16/2015</a:t>
             </a:fld>
             <a:endParaRPr lang="en-US" dirty="0"/>
           </a:p>
@@ -2170,7 +2175,7 @@
           <a:p>
             <a:fld id="{EF0B729F-5E1E-40E7-8D1F-2FBC0AA7C9CD}" type="datetime1">
               <a:rPr lang="en-US" smtClean="0"/>
-              <a:t>3/15/2015</a:t>
+              <a:t>3/16/2015</a:t>
             </a:fld>
             <a:endParaRPr lang="en-US" dirty="0"/>
           </a:p>
@@ -2465,7 +2470,7 @@
           <a:p>
             <a:fld id="{6C610283-F1E1-40D0-ACF0-C635052CA35C}" type="datetime1">
               <a:rPr lang="en-US" smtClean="0"/>
-              <a:t>3/15/2015</a:t>
+              <a:t>3/16/2015</a:t>
             </a:fld>
             <a:endParaRPr lang="en-US" dirty="0"/>
           </a:p>
@@ -2839,7 +2844,7 @@
           <a:p>
             <a:fld id="{DDCC8832-2E28-430A-AD8F-583F9F33222D}" type="datetime1">
               <a:rPr lang="en-US" smtClean="0"/>
-              <a:t>3/15/2015</a:t>
+              <a:t>3/16/2015</a:t>
             </a:fld>
             <a:endParaRPr lang="en-US" dirty="0"/>
           </a:p>
@@ -2990,7 +2995,7 @@
           <a:p>
             <a:fld id="{76E487D9-92EA-4374-B9A8-0C938596B06B}" type="datetime1">
               <a:rPr lang="en-US" smtClean="0"/>
-              <a:t>3/15/2015</a:t>
+              <a:t>3/16/2015</a:t>
             </a:fld>
             <a:endParaRPr lang="en-US" dirty="0"/>
           </a:p>
@@ -3151,7 +3156,7 @@
           <a:p>
             <a:fld id="{03B2E87A-4C56-4FB1-83A8-C433C44AFBA9}" type="datetime1">
               <a:rPr lang="en-US" smtClean="0"/>
-              <a:t>3/15/2015</a:t>
+              <a:t>3/16/2015</a:t>
             </a:fld>
             <a:endParaRPr lang="en-US" dirty="0"/>
           </a:p>
@@ -3315,7 +3320,7 @@
           <a:p>
             <a:fld id="{A5828E15-EAE5-4696-A498-9462A8D07DB3}" type="datetime1">
               <a:rPr lang="en-US" smtClean="0"/>
-              <a:t>3/15/2015</a:t>
+              <a:t>3/16/2015</a:t>
             </a:fld>
             <a:endParaRPr lang="en-US" dirty="0"/>
           </a:p>
@@ -3555,7 +3560,7 @@
           <a:p>
             <a:fld id="{30C89575-A7F9-45D9-8DD0-EEE9ED1F7FA0}" type="datetime1">
               <a:rPr lang="en-US" smtClean="0"/>
-              <a:t>3/15/2015</a:t>
+              <a:t>3/16/2015</a:t>
             </a:fld>
             <a:endParaRPr lang="en-US" dirty="0"/>
           </a:p>
@@ -3775,7 +3780,7 @@
           <a:p>
             <a:fld id="{7A131F54-E68E-47BE-8946-F526F364CBA6}" type="datetime1">
               <a:rPr lang="en-US" smtClean="0"/>
-              <a:t>3/15/2015</a:t>
+              <a:t>3/16/2015</a:t>
             </a:fld>
             <a:endParaRPr lang="en-US" dirty="0"/>
           </a:p>
@@ -4130,7 +4135,7 @@
           <a:p>
             <a:fld id="{54938A4C-ABDD-4D7F-9EE8-D2212DFA111A}" type="datetime1">
               <a:rPr lang="en-US" smtClean="0"/>
-              <a:t>3/15/2015</a:t>
+              <a:t>3/16/2015</a:t>
             </a:fld>
             <a:endParaRPr lang="en-US" dirty="0"/>
           </a:p>
@@ -4234,7 +4239,7 @@
           <a:p>
             <a:fld id="{472087FD-69A5-4863-93C8-147616460B5F}" type="datetime1">
               <a:rPr lang="en-US" smtClean="0"/>
-              <a:t>3/15/2015</a:t>
+              <a:t>3/16/2015</a:t>
             </a:fld>
             <a:endParaRPr lang="en-US" dirty="0"/>
           </a:p>
@@ -4310,7 +4315,7 @@
           <a:p>
             <a:fld id="{DE67AA65-3958-4B15-93E3-62DB88057388}" type="datetime1">
               <a:rPr lang="en-US" smtClean="0"/>
-              <a:t>3/15/2015</a:t>
+              <a:t>3/16/2015</a:t>
             </a:fld>
             <a:endParaRPr lang="en-US" dirty="0"/>
           </a:p>
@@ -4546,7 +4551,7 @@
           <a:p>
             <a:fld id="{3A3AF593-EE7A-4564-A95B-6C86BAEF9839}" type="datetime1">
               <a:rPr lang="en-US" smtClean="0"/>
-              <a:t>3/15/2015</a:t>
+              <a:t>3/16/2015</a:t>
             </a:fld>
             <a:endParaRPr lang="en-US" dirty="0"/>
           </a:p>
@@ -4790,7 +4795,7 @@
           <a:p>
             <a:fld id="{D226D4E0-B61D-4B17-878D-83CEB6B35F48}" type="datetime1">
               <a:rPr lang="en-US" smtClean="0"/>
-              <a:t>3/15/2015</a:t>
+              <a:t>3/16/2015</a:t>
             </a:fld>
             <a:endParaRPr lang="en-US" dirty="0"/>
           </a:p>
@@ -5514,7 +5519,7 @@
           <a:p>
             <a:fld id="{FA7EC809-ED1F-4983-9906-520EA3F002C5}" type="datetime1">
               <a:rPr lang="en-US" smtClean="0"/>
-              <a:t>3/15/2015</a:t>
+              <a:t>3/16/2015</a:t>
             </a:fld>
             <a:endParaRPr lang="en-US" dirty="0"/>
           </a:p>
@@ -6579,27 +6584,6 @@
       </p:sp>
       <p:sp>
         <p:nvSpPr>
-          <p:cNvPr id="3" name="Inhaltsplatzhalter 2"/>
-          <p:cNvSpPr>
-            <a:spLocks noGrp="1"/>
-          </p:cNvSpPr>
-          <p:nvPr>
-            <p:ph idx="1"/>
-          </p:nvPr>
-        </p:nvSpPr>
-        <p:spPr/>
-        <p:txBody>
-          <a:bodyPr>
-            <a:normAutofit/>
-          </a:bodyPr>
-          <a:lstStyle/>
-          <a:p>
-            <a:endParaRPr lang="de-DE" sz="3600" dirty="0" smtClean="0"/>
-          </a:p>
-        </p:txBody>
-      </p:sp>
-      <p:sp>
-        <p:nvSpPr>
           <p:cNvPr id="4" name="Fußzeilenplatzhalter 3"/>
           <p:cNvSpPr>
             <a:spLocks noGrp="1"/>
@@ -6621,6 +6605,35 @@
           </a:p>
         </p:txBody>
       </p:sp>
+      <p:pic>
+        <p:nvPicPr>
+          <p:cNvPr id="7" name="Inhaltsplatzhalter 6"/>
+          <p:cNvPicPr>
+            <a:picLocks noGrp="1" noChangeAspect="1"/>
+          </p:cNvPicPr>
+          <p:nvPr>
+            <p:ph idx="1"/>
+          </p:nvPr>
+        </p:nvPicPr>
+        <p:blipFill>
+          <a:blip r:embed="rId2">
+            <a:extLst>
+              <a:ext uri="{28A0092B-C50C-407E-A947-70E740481C1C}">
+                <a14:useLocalDpi xmlns:a14="http://schemas.microsoft.com/office/drawing/2010/main" val="0"/>
+              </a:ext>
+            </a:extLst>
+          </a:blip>
+          <a:stretch>
+            <a:fillRect/>
+          </a:stretch>
+        </p:blipFill>
+        <p:spPr>
+          <a:xfrm>
+            <a:off x="2775744" y="2429669"/>
+            <a:ext cx="4400550" cy="3343275"/>
+          </a:xfrm>
+        </p:spPr>
+      </p:pic>
     </p:spTree>
     <p:extLst>
       <p:ext uri="{BB962C8B-B14F-4D97-AF65-F5344CB8AC3E}">
@@ -6638,6 +6651,611 @@
       </p:par>
     </p:tnLst>
   </p:timing>
+</p:sld>
+</file>
+
+<file path=ppt/slides/slide5.xml><?xml version="1.0" encoding="utf-8"?>
+<p:sld xmlns:a="http://schemas.openxmlformats.org/drawingml/2006/main" xmlns:r="http://schemas.openxmlformats.org/officeDocument/2006/relationships" xmlns:p="http://schemas.openxmlformats.org/presentationml/2006/main">
+  <p:cSld>
+    <p:spTree>
+      <p:nvGrpSpPr>
+        <p:cNvPr id="1" name=""/>
+        <p:cNvGrpSpPr/>
+        <p:nvPr/>
+      </p:nvGrpSpPr>
+      <p:grpSpPr>
+        <a:xfrm>
+          <a:off x="0" y="0"/>
+          <a:ext cx="0" cy="0"/>
+          <a:chOff x="0" y="0"/>
+          <a:chExt cx="0" cy="0"/>
+        </a:xfrm>
+      </p:grpSpPr>
+      <p:sp>
+        <p:nvSpPr>
+          <p:cNvPr id="2" name="Titel 1"/>
+          <p:cNvSpPr>
+            <a:spLocks noGrp="1"/>
+          </p:cNvSpPr>
+          <p:nvPr>
+            <p:ph type="title"/>
+          </p:nvPr>
+        </p:nvSpPr>
+        <p:spPr/>
+        <p:txBody>
+          <a:bodyPr>
+            <a:normAutofit/>
+          </a:bodyPr>
+          <a:lstStyle/>
+          <a:p>
+            <a:r>
+              <a:rPr lang="de-DE" sz="4200" dirty="0" smtClean="0"/>
+              <a:t>Struktur - Landesgesundheitsamt</a:t>
+            </a:r>
+            <a:endParaRPr lang="de-DE" sz="4200" dirty="0"/>
+          </a:p>
+        </p:txBody>
+      </p:sp>
+      <p:sp>
+        <p:nvSpPr>
+          <p:cNvPr id="3" name="Inhaltsplatzhalter 2"/>
+          <p:cNvSpPr>
+            <a:spLocks noGrp="1"/>
+          </p:cNvSpPr>
+          <p:nvPr>
+            <p:ph idx="1"/>
+          </p:nvPr>
+        </p:nvSpPr>
+        <p:spPr/>
+        <p:txBody>
+          <a:bodyPr>
+            <a:normAutofit/>
+          </a:bodyPr>
+          <a:lstStyle/>
+          <a:p>
+            <a:r>
+              <a:rPr lang="de-DE" sz="2800" dirty="0" smtClean="0"/>
+              <a:t>Fachliche Leitstelle für öffentlichen Gesundheitsdienst</a:t>
+            </a:r>
+          </a:p>
+          <a:p>
+            <a:r>
+              <a:rPr lang="de-DE" sz="2800" dirty="0" smtClean="0"/>
+              <a:t>Abteilung 9 des Regierungspräsidiums Stuttgart</a:t>
+            </a:r>
+          </a:p>
+          <a:p>
+            <a:r>
+              <a:rPr lang="de-DE" sz="2800" dirty="0" smtClean="0"/>
+              <a:t>Besteht aus sechs Referaten</a:t>
+            </a:r>
+          </a:p>
+          <a:p>
+            <a:r>
+              <a:rPr lang="de-DE" sz="2800" dirty="0" smtClean="0"/>
+              <a:t>Mehrere Kompetenzzentren und Netzwerke eingegliedert</a:t>
+            </a:r>
+            <a:endParaRPr lang="de-DE" sz="2800" dirty="0"/>
+          </a:p>
+        </p:txBody>
+      </p:sp>
+      <p:sp>
+        <p:nvSpPr>
+          <p:cNvPr id="4" name="Fußzeilenplatzhalter 3"/>
+          <p:cNvSpPr>
+            <a:spLocks noGrp="1"/>
+          </p:cNvSpPr>
+          <p:nvPr>
+            <p:ph type="ftr" sz="quarter" idx="11"/>
+          </p:nvPr>
+        </p:nvSpPr>
+        <p:spPr/>
+        <p:txBody>
+          <a:bodyPr/>
+          <a:lstStyle/>
+          <a:p>
+            <a:r>
+              <a:rPr lang="en-US" smtClean="0"/>
+              <a:t>| Dominik Meixner | Dominique Cheray |</a:t>
+            </a:r>
+            <a:endParaRPr lang="en-US" dirty="0"/>
+          </a:p>
+        </p:txBody>
+      </p:sp>
+    </p:spTree>
+    <p:extLst>
+      <p:ext uri="{BB962C8B-B14F-4D97-AF65-F5344CB8AC3E}">
+        <p14:creationId xmlns:p14="http://schemas.microsoft.com/office/powerpoint/2010/main" val="2685514354"/>
+      </p:ext>
+    </p:extLst>
+  </p:cSld>
+  <p:clrMapOvr>
+    <a:masterClrMapping/>
+  </p:clrMapOvr>
+  <p:timing>
+    <p:tnLst>
+      <p:par>
+        <p:cTn id="1" dur="indefinite" restart="never" nodeType="tmRoot"/>
+      </p:par>
+    </p:tnLst>
+  </p:timing>
+</p:sld>
+</file>
+
+<file path=ppt/slides/slide6.xml><?xml version="1.0" encoding="utf-8"?>
+<p:sld xmlns:a="http://schemas.openxmlformats.org/drawingml/2006/main" xmlns:r="http://schemas.openxmlformats.org/officeDocument/2006/relationships" xmlns:p="http://schemas.openxmlformats.org/presentationml/2006/main">
+  <p:cSld>
+    <p:spTree>
+      <p:nvGrpSpPr>
+        <p:cNvPr id="1" name=""/>
+        <p:cNvGrpSpPr/>
+        <p:nvPr/>
+      </p:nvGrpSpPr>
+      <p:grpSpPr>
+        <a:xfrm>
+          <a:off x="0" y="0"/>
+          <a:ext cx="0" cy="0"/>
+          <a:chOff x="0" y="0"/>
+          <a:chExt cx="0" cy="0"/>
+        </a:xfrm>
+      </p:grpSpPr>
+      <p:sp>
+        <p:nvSpPr>
+          <p:cNvPr id="2" name="Titel 1"/>
+          <p:cNvSpPr>
+            <a:spLocks noGrp="1"/>
+          </p:cNvSpPr>
+          <p:nvPr>
+            <p:ph type="title"/>
+          </p:nvPr>
+        </p:nvSpPr>
+        <p:spPr/>
+        <p:txBody>
+          <a:bodyPr/>
+          <a:lstStyle/>
+          <a:p>
+            <a:r>
+              <a:rPr lang="de-DE" dirty="0"/>
+              <a:t>Struktur - Landesgesundheitsamt</a:t>
+            </a:r>
+          </a:p>
+        </p:txBody>
+      </p:sp>
+      <p:sp>
+        <p:nvSpPr>
+          <p:cNvPr id="3" name="Inhaltsplatzhalter 2"/>
+          <p:cNvSpPr>
+            <a:spLocks noGrp="1"/>
+          </p:cNvSpPr>
+          <p:nvPr>
+            <p:ph idx="1"/>
+          </p:nvPr>
+        </p:nvSpPr>
+        <p:spPr/>
+        <p:txBody>
+          <a:bodyPr>
+            <a:normAutofit/>
+          </a:bodyPr>
+          <a:lstStyle/>
+          <a:p>
+            <a:r>
+              <a:rPr lang="de-DE" sz="2800" dirty="0" smtClean="0"/>
+              <a:t>Referate des Landesgesundheitsamtes</a:t>
+            </a:r>
+          </a:p>
+          <a:p>
+            <a:pPr lvl="1"/>
+            <a:r>
+              <a:rPr lang="de-DE" sz="2600" dirty="0" smtClean="0"/>
+              <a:t>Referat 91: Recht und Verwaltung</a:t>
+            </a:r>
+          </a:p>
+          <a:p>
+            <a:pPr lvl="1"/>
+            <a:r>
+              <a:rPr lang="de-DE" sz="2600" dirty="0" smtClean="0"/>
+              <a:t>Referat 92: Landesprüfungsamt für Medizin und Pharmazie, Approbationswesen</a:t>
+            </a:r>
+          </a:p>
+          <a:p>
+            <a:pPr lvl="1"/>
+            <a:r>
+              <a:rPr lang="de-DE" sz="2600" dirty="0" smtClean="0"/>
+              <a:t>Referat 93: Allgemeine Hygiene, Infektionsschutz</a:t>
+            </a:r>
+          </a:p>
+        </p:txBody>
+      </p:sp>
+      <p:sp>
+        <p:nvSpPr>
+          <p:cNvPr id="4" name="Fußzeilenplatzhalter 3"/>
+          <p:cNvSpPr>
+            <a:spLocks noGrp="1"/>
+          </p:cNvSpPr>
+          <p:nvPr>
+            <p:ph type="ftr" sz="quarter" idx="11"/>
+          </p:nvPr>
+        </p:nvSpPr>
+        <p:spPr/>
+        <p:txBody>
+          <a:bodyPr/>
+          <a:lstStyle/>
+          <a:p>
+            <a:r>
+              <a:rPr lang="en-US" smtClean="0"/>
+              <a:t>| Dominik Meixner | Dominique Cheray |</a:t>
+            </a:r>
+            <a:endParaRPr lang="en-US" dirty="0"/>
+          </a:p>
+        </p:txBody>
+      </p:sp>
+    </p:spTree>
+    <p:extLst>
+      <p:ext uri="{BB962C8B-B14F-4D97-AF65-F5344CB8AC3E}">
+        <p14:creationId xmlns:p14="http://schemas.microsoft.com/office/powerpoint/2010/main" val="489741512"/>
+      </p:ext>
+    </p:extLst>
+  </p:cSld>
+  <p:clrMapOvr>
+    <a:masterClrMapping/>
+  </p:clrMapOvr>
+  <p:timing>
+    <p:tnLst>
+      <p:par>
+        <p:cTn id="1" dur="indefinite" restart="never" nodeType="tmRoot"/>
+      </p:par>
+    </p:tnLst>
+  </p:timing>
+</p:sld>
+</file>
+
+<file path=ppt/slides/slide7.xml><?xml version="1.0" encoding="utf-8"?>
+<p:sld xmlns:a="http://schemas.openxmlformats.org/drawingml/2006/main" xmlns:r="http://schemas.openxmlformats.org/officeDocument/2006/relationships" xmlns:p="http://schemas.openxmlformats.org/presentationml/2006/main">
+  <p:cSld>
+    <p:spTree>
+      <p:nvGrpSpPr>
+        <p:cNvPr id="1" name=""/>
+        <p:cNvGrpSpPr/>
+        <p:nvPr/>
+      </p:nvGrpSpPr>
+      <p:grpSpPr>
+        <a:xfrm>
+          <a:off x="0" y="0"/>
+          <a:ext cx="0" cy="0"/>
+          <a:chOff x="0" y="0"/>
+          <a:chExt cx="0" cy="0"/>
+        </a:xfrm>
+      </p:grpSpPr>
+      <p:sp>
+        <p:nvSpPr>
+          <p:cNvPr id="2" name="Titel 1"/>
+          <p:cNvSpPr>
+            <a:spLocks noGrp="1"/>
+          </p:cNvSpPr>
+          <p:nvPr>
+            <p:ph type="title"/>
+          </p:nvPr>
+        </p:nvSpPr>
+        <p:spPr/>
+        <p:txBody>
+          <a:bodyPr/>
+          <a:lstStyle/>
+          <a:p>
+            <a:r>
+              <a:rPr lang="de-DE" dirty="0"/>
+              <a:t>Struktur - Landesgesundheitsamt</a:t>
+            </a:r>
+          </a:p>
+        </p:txBody>
+      </p:sp>
+      <p:sp>
+        <p:nvSpPr>
+          <p:cNvPr id="3" name="Inhaltsplatzhalter 2"/>
+          <p:cNvSpPr>
+            <a:spLocks noGrp="1"/>
+          </p:cNvSpPr>
+          <p:nvPr>
+            <p:ph idx="1"/>
+          </p:nvPr>
+        </p:nvSpPr>
+        <p:spPr/>
+        <p:txBody>
+          <a:bodyPr/>
+          <a:lstStyle/>
+          <a:p>
+            <a:r>
+              <a:rPr lang="de-DE" sz="2800" dirty="0"/>
+              <a:t>Referate des </a:t>
+            </a:r>
+            <a:r>
+              <a:rPr lang="de-DE" sz="2800" dirty="0" smtClean="0"/>
+              <a:t>Landesgesundheitsamtes</a:t>
+            </a:r>
+          </a:p>
+          <a:p>
+            <a:pPr lvl="1"/>
+            <a:r>
+              <a:rPr lang="de-DE" sz="2600" dirty="0"/>
+              <a:t>Referat 94: Gesundheitsförderung, Prävention, Landesarzt für behinderte </a:t>
+            </a:r>
+            <a:r>
+              <a:rPr lang="de-DE" sz="2600" dirty="0" smtClean="0"/>
+              <a:t>Menschen</a:t>
+            </a:r>
+            <a:endParaRPr lang="de-DE" sz="2600" dirty="0"/>
+          </a:p>
+          <a:p>
+            <a:pPr lvl="1"/>
+            <a:r>
+              <a:rPr lang="de-DE" sz="2800" dirty="0" smtClean="0"/>
+              <a:t>Referat 95: Epidemiologie</a:t>
+            </a:r>
+          </a:p>
+          <a:p>
+            <a:pPr lvl="1"/>
+            <a:r>
+              <a:rPr lang="de-DE" sz="2800" dirty="0" smtClean="0"/>
+              <a:t>Referat 96: Arbeitsmedizin, Umweltbezogener Gesundheitsschutz, Staatlicher Gewerbearzt</a:t>
+            </a:r>
+          </a:p>
+        </p:txBody>
+      </p:sp>
+      <p:sp>
+        <p:nvSpPr>
+          <p:cNvPr id="4" name="Fußzeilenplatzhalter 3"/>
+          <p:cNvSpPr>
+            <a:spLocks noGrp="1"/>
+          </p:cNvSpPr>
+          <p:nvPr>
+            <p:ph type="ftr" sz="quarter" idx="11"/>
+          </p:nvPr>
+        </p:nvSpPr>
+        <p:spPr/>
+        <p:txBody>
+          <a:bodyPr/>
+          <a:lstStyle/>
+          <a:p>
+            <a:r>
+              <a:rPr lang="en-US" smtClean="0"/>
+              <a:t>| Dominik Meixner | Dominique Cheray |</a:t>
+            </a:r>
+            <a:endParaRPr lang="en-US" dirty="0"/>
+          </a:p>
+        </p:txBody>
+      </p:sp>
+    </p:spTree>
+    <p:extLst>
+      <p:ext uri="{BB962C8B-B14F-4D97-AF65-F5344CB8AC3E}">
+        <p14:creationId xmlns:p14="http://schemas.microsoft.com/office/powerpoint/2010/main" val="1485707775"/>
+      </p:ext>
+    </p:extLst>
+  </p:cSld>
+  <p:clrMapOvr>
+    <a:masterClrMapping/>
+  </p:clrMapOvr>
+  <p:timing>
+    <p:tnLst>
+      <p:par>
+        <p:cTn id="1" dur="indefinite" restart="never" nodeType="tmRoot"/>
+      </p:par>
+    </p:tnLst>
+  </p:timing>
+</p:sld>
+</file>
+
+<file path=ppt/slides/slide8.xml><?xml version="1.0" encoding="utf-8"?>
+<p:sld xmlns:a="http://schemas.openxmlformats.org/drawingml/2006/main" xmlns:r="http://schemas.openxmlformats.org/officeDocument/2006/relationships" xmlns:p="http://schemas.openxmlformats.org/presentationml/2006/main">
+  <p:cSld>
+    <p:spTree>
+      <p:nvGrpSpPr>
+        <p:cNvPr id="1" name=""/>
+        <p:cNvGrpSpPr/>
+        <p:nvPr/>
+      </p:nvGrpSpPr>
+      <p:grpSpPr>
+        <a:xfrm>
+          <a:off x="0" y="0"/>
+          <a:ext cx="0" cy="0"/>
+          <a:chOff x="0" y="0"/>
+          <a:chExt cx="0" cy="0"/>
+        </a:xfrm>
+      </p:grpSpPr>
+      <p:sp>
+        <p:nvSpPr>
+          <p:cNvPr id="2" name="Titel 1"/>
+          <p:cNvSpPr>
+            <a:spLocks noGrp="1"/>
+          </p:cNvSpPr>
+          <p:nvPr>
+            <p:ph type="title"/>
+          </p:nvPr>
+        </p:nvSpPr>
+        <p:spPr/>
+        <p:txBody>
+          <a:bodyPr>
+            <a:normAutofit fontScale="90000"/>
+          </a:bodyPr>
+          <a:lstStyle/>
+          <a:p>
+            <a:r>
+              <a:rPr lang="de-DE" sz="4200" dirty="0"/>
+              <a:t>Struktur </a:t>
+            </a:r>
+            <a:r>
+              <a:rPr lang="de-DE" sz="4200" dirty="0" smtClean="0"/>
+              <a:t>– Gesundheitsämter in Stadt- und Landkreisen</a:t>
+            </a:r>
+            <a:endParaRPr lang="de-DE" sz="4200" dirty="0"/>
+          </a:p>
+        </p:txBody>
+      </p:sp>
+      <p:sp>
+        <p:nvSpPr>
+          <p:cNvPr id="3" name="Inhaltsplatzhalter 2"/>
+          <p:cNvSpPr>
+            <a:spLocks noGrp="1"/>
+          </p:cNvSpPr>
+          <p:nvPr>
+            <p:ph idx="1"/>
+          </p:nvPr>
+        </p:nvSpPr>
+        <p:spPr/>
+        <p:txBody>
+          <a:bodyPr>
+            <a:normAutofit/>
+          </a:bodyPr>
+          <a:lstStyle/>
+          <a:p>
+            <a:r>
+              <a:rPr lang="de-DE" sz="2800" dirty="0" smtClean="0"/>
+              <a:t>35 Gesundheitsämter in Landratsämtern</a:t>
+            </a:r>
+          </a:p>
+          <a:p>
+            <a:r>
+              <a:rPr lang="de-DE" sz="2800" dirty="0" smtClean="0"/>
+              <a:t>3 städtische Gesundheitsämter</a:t>
+            </a:r>
+          </a:p>
+          <a:p>
+            <a:r>
+              <a:rPr lang="de-DE" sz="2800" dirty="0" smtClean="0"/>
+              <a:t>Sind untere Gesundheitsbehörden vor Ort</a:t>
+            </a:r>
+          </a:p>
+          <a:p>
+            <a:r>
+              <a:rPr lang="de-DE" sz="2800" dirty="0" smtClean="0"/>
+              <a:t>Eigentliche Ansprechpartner für gesundheitliche Belange</a:t>
+            </a:r>
+            <a:endParaRPr lang="de-DE" sz="2800" dirty="0"/>
+          </a:p>
+        </p:txBody>
+      </p:sp>
+      <p:sp>
+        <p:nvSpPr>
+          <p:cNvPr id="4" name="Fußzeilenplatzhalter 3"/>
+          <p:cNvSpPr>
+            <a:spLocks noGrp="1"/>
+          </p:cNvSpPr>
+          <p:nvPr>
+            <p:ph type="ftr" sz="quarter" idx="11"/>
+          </p:nvPr>
+        </p:nvSpPr>
+        <p:spPr/>
+        <p:txBody>
+          <a:bodyPr/>
+          <a:lstStyle/>
+          <a:p>
+            <a:r>
+              <a:rPr lang="en-US" smtClean="0"/>
+              <a:t>| Dominik Meixner | Dominique Cheray |</a:t>
+            </a:r>
+            <a:endParaRPr lang="en-US" dirty="0"/>
+          </a:p>
+        </p:txBody>
+      </p:sp>
+    </p:spTree>
+    <p:extLst>
+      <p:ext uri="{BB962C8B-B14F-4D97-AF65-F5344CB8AC3E}">
+        <p14:creationId xmlns:p14="http://schemas.microsoft.com/office/powerpoint/2010/main" val="2547116917"/>
+      </p:ext>
+    </p:extLst>
+  </p:cSld>
+  <p:clrMapOvr>
+    <a:masterClrMapping/>
+  </p:clrMapOvr>
+</p:sld>
+</file>
+
+<file path=ppt/slides/slide9.xml><?xml version="1.0" encoding="utf-8"?>
+<p:sld xmlns:a="http://schemas.openxmlformats.org/drawingml/2006/main" xmlns:r="http://schemas.openxmlformats.org/officeDocument/2006/relationships" xmlns:p="http://schemas.openxmlformats.org/presentationml/2006/main">
+  <p:cSld>
+    <p:spTree>
+      <p:nvGrpSpPr>
+        <p:cNvPr id="1" name=""/>
+        <p:cNvGrpSpPr/>
+        <p:nvPr/>
+      </p:nvGrpSpPr>
+      <p:grpSpPr>
+        <a:xfrm>
+          <a:off x="0" y="0"/>
+          <a:ext cx="0" cy="0"/>
+          <a:chOff x="0" y="0"/>
+          <a:chExt cx="0" cy="0"/>
+        </a:xfrm>
+      </p:grpSpPr>
+      <p:sp>
+        <p:nvSpPr>
+          <p:cNvPr id="2" name="Titel 1"/>
+          <p:cNvSpPr>
+            <a:spLocks noGrp="1"/>
+          </p:cNvSpPr>
+          <p:nvPr>
+            <p:ph type="title"/>
+          </p:nvPr>
+        </p:nvSpPr>
+        <p:spPr/>
+        <p:txBody>
+          <a:bodyPr/>
+          <a:lstStyle/>
+          <a:p>
+            <a:endParaRPr lang="de-DE"/>
+          </a:p>
+        </p:txBody>
+      </p:sp>
+      <p:sp>
+        <p:nvSpPr>
+          <p:cNvPr id="3" name="Inhaltsplatzhalter 2"/>
+          <p:cNvSpPr>
+            <a:spLocks noGrp="1"/>
+          </p:cNvSpPr>
+          <p:nvPr>
+            <p:ph idx="1"/>
+          </p:nvPr>
+        </p:nvSpPr>
+        <p:spPr/>
+        <p:txBody>
+          <a:bodyPr/>
+          <a:lstStyle/>
+          <a:p>
+            <a:endParaRPr lang="de-DE"/>
+          </a:p>
+        </p:txBody>
+      </p:sp>
+      <p:sp>
+        <p:nvSpPr>
+          <p:cNvPr id="4" name="Fußzeilenplatzhalter 3"/>
+          <p:cNvSpPr>
+            <a:spLocks noGrp="1"/>
+          </p:cNvSpPr>
+          <p:nvPr>
+            <p:ph type="ftr" sz="quarter" idx="11"/>
+          </p:nvPr>
+        </p:nvSpPr>
+        <p:spPr/>
+        <p:txBody>
+          <a:bodyPr/>
+          <a:lstStyle/>
+          <a:p>
+            <a:r>
+              <a:rPr lang="en-US" smtClean="0"/>
+              <a:t>| Dominik Meixner | Dominique Cheray |</a:t>
+            </a:r>
+            <a:endParaRPr lang="en-US" dirty="0"/>
+          </a:p>
+        </p:txBody>
+      </p:sp>
+    </p:spTree>
+    <p:extLst>
+      <p:ext uri="{BB962C8B-B14F-4D97-AF65-F5344CB8AC3E}">
+        <p14:creationId xmlns:p14="http://schemas.microsoft.com/office/powerpoint/2010/main" val="1476526236"/>
+      </p:ext>
+    </p:extLst>
+  </p:cSld>
+  <p:clrMapOvr>
+    <a:masterClrMapping/>
+  </p:clrMapOvr>
 </p:sld>
 </file>
 
@@ -6892,7 +7510,7 @@
   <a:extraClrSchemeLst/>
   <a:extLst>
     <a:ext uri="{05A4C25C-085E-4340-85A3-A5531E510DB2}">
-      <thm15:themeFamily xmlns="" xmlns:thm15="http://schemas.microsoft.com/office/thememl/2012/main" name="Facet" id="{C0C680CD-088A-49FC-A102-D699147F32B2}" vid="{CFBC31BA-B70F-4F30-BCAA-4F3011E16C4D}"/>
+      <thm15:themeFamily xmlns:thm15="http://schemas.microsoft.com/office/thememl/2012/main" xmlns="" name="Facet" id="{C0C680CD-088A-49FC-A102-D699147F32B2}" vid="{CFBC31BA-B70F-4F30-BCAA-4F3011E16C4D}"/>
     </a:ext>
   </a:extLst>
 </a:theme>
@@ -7153,7 +7771,7 @@
   <a:extraClrSchemeLst/>
   <a:extLst>
     <a:ext uri="{05A4C25C-085E-4340-85A3-A5531E510DB2}">
-      <thm15:themeFamily xmlns="" xmlns:thm15="http://schemas.microsoft.com/office/thememl/2012/main" name="Office Theme" id="{62F939B6-93AF-4DB8-9C6B-D6C7DFDC589F}" vid="{4A3C46E8-61CC-4603-A589-7422A47A8E4A}"/>
+      <thm15:themeFamily xmlns:thm15="http://schemas.microsoft.com/office/thememl/2012/main" xmlns="" name="Office Theme" id="{62F939B6-93AF-4DB8-9C6B-D6C7DFDC589F}" vid="{4A3C46E8-61CC-4603-A589-7422A47A8E4A}"/>
     </a:ext>
   </a:extLst>
 </a:theme>

</xml_diff>

<commit_message>
Und noch mehr Präsentation
Aufgaben der Ämter zugefügt. Und jetzt mach ich Pause und geh was essen.
:)
</commit_message>
<xml_diff>
--- a/GesundheitsamtPraes.pptx
+++ b/GesundheitsamtPraes.pptx
@@ -5,7 +5,7 @@
     <p:sldMasterId id="2147483685" r:id="rId1"/>
   </p:sldMasterIdLst>
   <p:notesMasterIdLst>
-    <p:notesMasterId r:id="rId11"/>
+    <p:notesMasterId r:id="rId15"/>
   </p:notesMasterIdLst>
   <p:sldIdLst>
     <p:sldId id="256" r:id="rId2"/>
@@ -17,6 +17,10 @@
     <p:sldId id="262" r:id="rId8"/>
     <p:sldId id="263" r:id="rId9"/>
     <p:sldId id="264" r:id="rId10"/>
+    <p:sldId id="265" r:id="rId11"/>
+    <p:sldId id="266" r:id="rId12"/>
+    <p:sldId id="267" r:id="rId13"/>
+    <p:sldId id="268" r:id="rId14"/>
   </p:sldIdLst>
   <p:sldSz cx="12192000" cy="6858000"/>
   <p:notesSz cx="6858000" cy="9144000"/>
@@ -6263,6 +6267,503 @@
 </p:sld>
 </file>
 
+<file path=ppt/slides/slide10.xml><?xml version="1.0" encoding="utf-8"?>
+<p:sld xmlns:a="http://schemas.openxmlformats.org/drawingml/2006/main" xmlns:r="http://schemas.openxmlformats.org/officeDocument/2006/relationships" xmlns:p="http://schemas.openxmlformats.org/presentationml/2006/main">
+  <p:cSld>
+    <p:spTree>
+      <p:nvGrpSpPr>
+        <p:cNvPr id="1" name=""/>
+        <p:cNvGrpSpPr/>
+        <p:nvPr/>
+      </p:nvGrpSpPr>
+      <p:grpSpPr>
+        <a:xfrm>
+          <a:off x="0" y="0"/>
+          <a:ext cx="0" cy="0"/>
+          <a:chOff x="0" y="0"/>
+          <a:chExt cx="0" cy="0"/>
+        </a:xfrm>
+      </p:grpSpPr>
+      <p:sp>
+        <p:nvSpPr>
+          <p:cNvPr id="2" name="Titel 1"/>
+          <p:cNvSpPr>
+            <a:spLocks noGrp="1"/>
+          </p:cNvSpPr>
+          <p:nvPr>
+            <p:ph type="title"/>
+          </p:nvPr>
+        </p:nvSpPr>
+        <p:spPr/>
+        <p:txBody>
+          <a:bodyPr>
+            <a:normAutofit/>
+          </a:bodyPr>
+          <a:lstStyle/>
+          <a:p>
+            <a:r>
+              <a:rPr lang="de-DE" sz="4200" dirty="0"/>
+              <a:t>Aufgaben - Landesgesundheitsamt</a:t>
+            </a:r>
+          </a:p>
+        </p:txBody>
+      </p:sp>
+      <p:sp>
+        <p:nvSpPr>
+          <p:cNvPr id="3" name="Inhaltsplatzhalter 2"/>
+          <p:cNvSpPr>
+            <a:spLocks noGrp="1"/>
+          </p:cNvSpPr>
+          <p:nvPr>
+            <p:ph idx="1"/>
+          </p:nvPr>
+        </p:nvSpPr>
+        <p:spPr/>
+        <p:txBody>
+          <a:bodyPr>
+            <a:normAutofit/>
+          </a:bodyPr>
+          <a:lstStyle/>
+          <a:p>
+            <a:pPr marL="342900" lvl="1" indent="-342900"/>
+            <a:r>
+              <a:rPr lang="de-DE" sz="2800" dirty="0" smtClean="0"/>
+              <a:t>Landesprüfungsamt </a:t>
+            </a:r>
+            <a:r>
+              <a:rPr lang="de-DE" sz="2800" dirty="0"/>
+              <a:t>für medizinische Ausbildungen und Berufe</a:t>
+            </a:r>
+          </a:p>
+          <a:p>
+            <a:pPr marL="342900" lvl="1" indent="-342900"/>
+            <a:r>
+              <a:rPr lang="de-DE" sz="2800" dirty="0"/>
+              <a:t>Programme in der Aus-, Fort- und Weiterbildung</a:t>
+            </a:r>
+          </a:p>
+          <a:p>
+            <a:endParaRPr lang="de-DE" sz="2800" dirty="0"/>
+          </a:p>
+        </p:txBody>
+      </p:sp>
+      <p:sp>
+        <p:nvSpPr>
+          <p:cNvPr id="4" name="Fußzeilenplatzhalter 3"/>
+          <p:cNvSpPr>
+            <a:spLocks noGrp="1"/>
+          </p:cNvSpPr>
+          <p:nvPr>
+            <p:ph type="ftr" sz="quarter" idx="11"/>
+          </p:nvPr>
+        </p:nvSpPr>
+        <p:spPr/>
+        <p:txBody>
+          <a:bodyPr/>
+          <a:lstStyle/>
+          <a:p>
+            <a:r>
+              <a:rPr lang="en-US" smtClean="0"/>
+              <a:t>| Dominik Meixner | Dominique Cheray |</a:t>
+            </a:r>
+            <a:endParaRPr lang="en-US" dirty="0"/>
+          </a:p>
+        </p:txBody>
+      </p:sp>
+    </p:spTree>
+    <p:extLst>
+      <p:ext uri="{BB962C8B-B14F-4D97-AF65-F5344CB8AC3E}">
+        <p14:creationId xmlns:p14="http://schemas.microsoft.com/office/powerpoint/2010/main" val="2394333967"/>
+      </p:ext>
+    </p:extLst>
+  </p:cSld>
+  <p:clrMapOvr>
+    <a:masterClrMapping/>
+  </p:clrMapOvr>
+  <p:timing>
+    <p:tnLst>
+      <p:par>
+        <p:cTn id="1" dur="indefinite" restart="never" nodeType="tmRoot"/>
+      </p:par>
+    </p:tnLst>
+  </p:timing>
+</p:sld>
+</file>
+
+<file path=ppt/slides/slide11.xml><?xml version="1.0" encoding="utf-8"?>
+<p:sld xmlns:a="http://schemas.openxmlformats.org/drawingml/2006/main" xmlns:r="http://schemas.openxmlformats.org/officeDocument/2006/relationships" xmlns:p="http://schemas.openxmlformats.org/presentationml/2006/main">
+  <p:cSld>
+    <p:spTree>
+      <p:nvGrpSpPr>
+        <p:cNvPr id="1" name=""/>
+        <p:cNvGrpSpPr/>
+        <p:nvPr/>
+      </p:nvGrpSpPr>
+      <p:grpSpPr>
+        <a:xfrm>
+          <a:off x="0" y="0"/>
+          <a:ext cx="0" cy="0"/>
+          <a:chOff x="0" y="0"/>
+          <a:chExt cx="0" cy="0"/>
+        </a:xfrm>
+      </p:grpSpPr>
+      <p:sp>
+        <p:nvSpPr>
+          <p:cNvPr id="2" name="Titel 1"/>
+          <p:cNvSpPr>
+            <a:spLocks noGrp="1"/>
+          </p:cNvSpPr>
+          <p:nvPr>
+            <p:ph type="title"/>
+          </p:nvPr>
+        </p:nvSpPr>
+        <p:spPr/>
+        <p:txBody>
+          <a:bodyPr>
+            <a:noAutofit/>
+          </a:bodyPr>
+          <a:lstStyle/>
+          <a:p>
+            <a:r>
+              <a:rPr lang="de-DE" sz="4200" dirty="0" smtClean="0"/>
+              <a:t>Aufgaben </a:t>
+            </a:r>
+            <a:r>
+              <a:rPr lang="de-DE" sz="4200" dirty="0"/>
+              <a:t>– Gesundheitsämter in Stadt- und Landkreisen</a:t>
+            </a:r>
+          </a:p>
+        </p:txBody>
+      </p:sp>
+      <p:sp>
+        <p:nvSpPr>
+          <p:cNvPr id="3" name="Inhaltsplatzhalter 2"/>
+          <p:cNvSpPr>
+            <a:spLocks noGrp="1"/>
+          </p:cNvSpPr>
+          <p:nvPr>
+            <p:ph idx="1"/>
+          </p:nvPr>
+        </p:nvSpPr>
+        <p:spPr/>
+        <p:txBody>
+          <a:bodyPr>
+            <a:normAutofit/>
+          </a:bodyPr>
+          <a:lstStyle/>
+          <a:p>
+            <a:endParaRPr lang="de-DE" sz="2800" dirty="0" smtClean="0"/>
+          </a:p>
+          <a:p>
+            <a:r>
+              <a:rPr lang="de-DE" sz="2800" dirty="0" smtClean="0"/>
+              <a:t>Gesundheitsschutz </a:t>
+            </a:r>
+          </a:p>
+          <a:p>
+            <a:pPr lvl="1"/>
+            <a:r>
+              <a:rPr lang="de-DE" sz="2600" dirty="0" smtClean="0"/>
+              <a:t>Infektionsschutz</a:t>
+            </a:r>
+          </a:p>
+          <a:p>
+            <a:pPr lvl="1"/>
+            <a:r>
+              <a:rPr lang="de-DE" sz="2600" dirty="0" smtClean="0"/>
+              <a:t>Umweltbezogener Gesundheitsschutz</a:t>
+            </a:r>
+          </a:p>
+          <a:p>
+            <a:r>
+              <a:rPr lang="de-DE" sz="2800" dirty="0" smtClean="0"/>
+              <a:t>Gesundheitsförderung und Prävention</a:t>
+            </a:r>
+          </a:p>
+          <a:p>
+            <a:r>
+              <a:rPr lang="de-DE" sz="2800" dirty="0" smtClean="0"/>
+              <a:t>Gesundheitsberichterstattung und </a:t>
+            </a:r>
+            <a:r>
+              <a:rPr lang="de-DE" sz="2800" dirty="0" err="1" smtClean="0"/>
+              <a:t>Epdemiologie</a:t>
+            </a:r>
+            <a:endParaRPr lang="de-DE" sz="2800" dirty="0" smtClean="0"/>
+          </a:p>
+          <a:p>
+            <a:endParaRPr lang="de-DE" sz="2800" dirty="0"/>
+          </a:p>
+        </p:txBody>
+      </p:sp>
+      <p:sp>
+        <p:nvSpPr>
+          <p:cNvPr id="4" name="Fußzeilenplatzhalter 3"/>
+          <p:cNvSpPr>
+            <a:spLocks noGrp="1"/>
+          </p:cNvSpPr>
+          <p:nvPr>
+            <p:ph type="ftr" sz="quarter" idx="11"/>
+          </p:nvPr>
+        </p:nvSpPr>
+        <p:spPr/>
+        <p:txBody>
+          <a:bodyPr/>
+          <a:lstStyle/>
+          <a:p>
+            <a:r>
+              <a:rPr lang="en-US" smtClean="0"/>
+              <a:t>| Dominik Meixner | Dominique Cheray |</a:t>
+            </a:r>
+            <a:endParaRPr lang="en-US" dirty="0"/>
+          </a:p>
+        </p:txBody>
+      </p:sp>
+    </p:spTree>
+    <p:extLst>
+      <p:ext uri="{BB962C8B-B14F-4D97-AF65-F5344CB8AC3E}">
+        <p14:creationId xmlns:p14="http://schemas.microsoft.com/office/powerpoint/2010/main" val="2832033808"/>
+      </p:ext>
+    </p:extLst>
+  </p:cSld>
+  <p:clrMapOvr>
+    <a:masterClrMapping/>
+  </p:clrMapOvr>
+</p:sld>
+</file>
+
+<file path=ppt/slides/slide12.xml><?xml version="1.0" encoding="utf-8"?>
+<p:sld xmlns:a="http://schemas.openxmlformats.org/drawingml/2006/main" xmlns:r="http://schemas.openxmlformats.org/officeDocument/2006/relationships" xmlns:p="http://schemas.openxmlformats.org/presentationml/2006/main">
+  <p:cSld>
+    <p:spTree>
+      <p:nvGrpSpPr>
+        <p:cNvPr id="1" name=""/>
+        <p:cNvGrpSpPr/>
+        <p:nvPr/>
+      </p:nvGrpSpPr>
+      <p:grpSpPr>
+        <a:xfrm>
+          <a:off x="0" y="0"/>
+          <a:ext cx="0" cy="0"/>
+          <a:chOff x="0" y="0"/>
+          <a:chExt cx="0" cy="0"/>
+        </a:xfrm>
+      </p:grpSpPr>
+      <p:sp>
+        <p:nvSpPr>
+          <p:cNvPr id="2" name="Titel 1"/>
+          <p:cNvSpPr>
+            <a:spLocks noGrp="1"/>
+          </p:cNvSpPr>
+          <p:nvPr>
+            <p:ph type="title"/>
+          </p:nvPr>
+        </p:nvSpPr>
+        <p:spPr/>
+        <p:txBody>
+          <a:bodyPr>
+            <a:noAutofit/>
+          </a:bodyPr>
+          <a:lstStyle/>
+          <a:p>
+            <a:r>
+              <a:rPr lang="de-DE" sz="4200" dirty="0"/>
+              <a:t>Aufgaben – Gesundheitsämter in Stadt- und Landkreisen</a:t>
+            </a:r>
+          </a:p>
+        </p:txBody>
+      </p:sp>
+      <p:sp>
+        <p:nvSpPr>
+          <p:cNvPr id="3" name="Inhaltsplatzhalter 2"/>
+          <p:cNvSpPr>
+            <a:spLocks noGrp="1"/>
+          </p:cNvSpPr>
+          <p:nvPr>
+            <p:ph idx="1"/>
+          </p:nvPr>
+        </p:nvSpPr>
+        <p:spPr/>
+        <p:txBody>
+          <a:bodyPr>
+            <a:normAutofit/>
+          </a:bodyPr>
+          <a:lstStyle/>
+          <a:p>
+            <a:endParaRPr lang="de-DE" sz="2800" dirty="0" smtClean="0"/>
+          </a:p>
+          <a:p>
+            <a:r>
+              <a:rPr lang="de-DE" sz="2800" dirty="0" smtClean="0"/>
+              <a:t>Kinder- </a:t>
+            </a:r>
+            <a:r>
+              <a:rPr lang="de-DE" sz="2800" dirty="0"/>
+              <a:t>und </a:t>
+            </a:r>
+            <a:r>
+              <a:rPr lang="de-DE" sz="2800" dirty="0" smtClean="0"/>
+              <a:t>Jugendgesundheitsdienst</a:t>
+            </a:r>
+          </a:p>
+          <a:p>
+            <a:r>
+              <a:rPr lang="de-DE" sz="2800" dirty="0" smtClean="0"/>
+              <a:t>sozialmedizinische </a:t>
+            </a:r>
+            <a:r>
+              <a:rPr lang="de-DE" sz="2800" dirty="0"/>
+              <a:t>und sozialpsychiatrische Beratung, Betreuung und Vermittlung von Hilfen für besondere </a:t>
+            </a:r>
+            <a:r>
+              <a:rPr lang="de-DE" sz="2800" dirty="0" smtClean="0"/>
+              <a:t>Zielgruppen</a:t>
+            </a:r>
+          </a:p>
+          <a:p>
+            <a:r>
+              <a:rPr lang="de-DE" sz="2800" dirty="0"/>
+              <a:t>amtsärztlicher Dienst sowie gutachterliche Tätigkeiten</a:t>
+            </a:r>
+            <a:endParaRPr lang="de-DE" sz="2800" dirty="0"/>
+          </a:p>
+        </p:txBody>
+      </p:sp>
+      <p:sp>
+        <p:nvSpPr>
+          <p:cNvPr id="4" name="Fußzeilenplatzhalter 3"/>
+          <p:cNvSpPr>
+            <a:spLocks noGrp="1"/>
+          </p:cNvSpPr>
+          <p:nvPr>
+            <p:ph type="ftr" sz="quarter" idx="11"/>
+          </p:nvPr>
+        </p:nvSpPr>
+        <p:spPr/>
+        <p:txBody>
+          <a:bodyPr/>
+          <a:lstStyle/>
+          <a:p>
+            <a:r>
+              <a:rPr lang="en-US" smtClean="0"/>
+              <a:t>| Dominik Meixner | Dominique Cheray |</a:t>
+            </a:r>
+            <a:endParaRPr lang="en-US" dirty="0"/>
+          </a:p>
+        </p:txBody>
+      </p:sp>
+    </p:spTree>
+    <p:extLst>
+      <p:ext uri="{BB962C8B-B14F-4D97-AF65-F5344CB8AC3E}">
+        <p14:creationId xmlns:p14="http://schemas.microsoft.com/office/powerpoint/2010/main" val="2907833448"/>
+      </p:ext>
+    </p:extLst>
+  </p:cSld>
+  <p:clrMapOvr>
+    <a:masterClrMapping/>
+  </p:clrMapOvr>
+</p:sld>
+</file>
+
+<file path=ppt/slides/slide13.xml><?xml version="1.0" encoding="utf-8"?>
+<p:sld xmlns:a="http://schemas.openxmlformats.org/drawingml/2006/main" xmlns:r="http://schemas.openxmlformats.org/officeDocument/2006/relationships" xmlns:p="http://schemas.openxmlformats.org/presentationml/2006/main">
+  <p:cSld>
+    <p:spTree>
+      <p:nvGrpSpPr>
+        <p:cNvPr id="1" name=""/>
+        <p:cNvGrpSpPr/>
+        <p:nvPr/>
+      </p:nvGrpSpPr>
+      <p:grpSpPr>
+        <a:xfrm>
+          <a:off x="0" y="0"/>
+          <a:ext cx="0" cy="0"/>
+          <a:chOff x="0" y="0"/>
+          <a:chExt cx="0" cy="0"/>
+        </a:xfrm>
+      </p:grpSpPr>
+      <p:sp>
+        <p:nvSpPr>
+          <p:cNvPr id="2" name="Titel 1"/>
+          <p:cNvSpPr>
+            <a:spLocks noGrp="1"/>
+          </p:cNvSpPr>
+          <p:nvPr>
+            <p:ph type="title"/>
+          </p:nvPr>
+        </p:nvSpPr>
+        <p:spPr/>
+        <p:txBody>
+          <a:bodyPr>
+            <a:normAutofit/>
+          </a:bodyPr>
+          <a:lstStyle/>
+          <a:p>
+            <a:r>
+              <a:rPr lang="de-DE" sz="4200" dirty="0" smtClean="0"/>
+              <a:t>Prozesse</a:t>
+            </a:r>
+            <a:endParaRPr lang="de-DE" sz="4200" dirty="0"/>
+          </a:p>
+        </p:txBody>
+      </p:sp>
+      <p:sp>
+        <p:nvSpPr>
+          <p:cNvPr id="3" name="Inhaltsplatzhalter 2"/>
+          <p:cNvSpPr>
+            <a:spLocks noGrp="1"/>
+          </p:cNvSpPr>
+          <p:nvPr>
+            <p:ph idx="1"/>
+          </p:nvPr>
+        </p:nvSpPr>
+        <p:spPr/>
+        <p:txBody>
+          <a:bodyPr>
+            <a:normAutofit/>
+          </a:bodyPr>
+          <a:lstStyle/>
+          <a:p>
+            <a:endParaRPr lang="de-DE" sz="2800"/>
+          </a:p>
+        </p:txBody>
+      </p:sp>
+      <p:sp>
+        <p:nvSpPr>
+          <p:cNvPr id="4" name="Fußzeilenplatzhalter 3"/>
+          <p:cNvSpPr>
+            <a:spLocks noGrp="1"/>
+          </p:cNvSpPr>
+          <p:nvPr>
+            <p:ph type="ftr" sz="quarter" idx="11"/>
+          </p:nvPr>
+        </p:nvSpPr>
+        <p:spPr/>
+        <p:txBody>
+          <a:bodyPr/>
+          <a:lstStyle/>
+          <a:p>
+            <a:r>
+              <a:rPr lang="en-US" smtClean="0"/>
+              <a:t>| Dominik Meixner | Dominique Cheray |</a:t>
+            </a:r>
+            <a:endParaRPr lang="en-US" dirty="0"/>
+          </a:p>
+        </p:txBody>
+      </p:sp>
+    </p:spTree>
+    <p:extLst>
+      <p:ext uri="{BB962C8B-B14F-4D97-AF65-F5344CB8AC3E}">
+        <p14:creationId xmlns:p14="http://schemas.microsoft.com/office/powerpoint/2010/main" val="707178402"/>
+      </p:ext>
+    </p:extLst>
+  </p:cSld>
+  <p:clrMapOvr>
+    <a:masterClrMapping/>
+  </p:clrMapOvr>
+</p:sld>
+</file>
+
 <file path=ppt/slides/slide2.xml><?xml version="1.0" encoding="utf-8"?>
 <p:sld xmlns:a="http://schemas.openxmlformats.org/drawingml/2006/main" xmlns:r="http://schemas.openxmlformats.org/officeDocument/2006/relationships" xmlns:p="http://schemas.openxmlformats.org/presentationml/2006/main">
   <p:cSld>
@@ -6811,11 +7312,13 @@
         </p:nvSpPr>
         <p:spPr/>
         <p:txBody>
-          <a:bodyPr/>
-          <a:lstStyle/>
-          <a:p>
-            <a:r>
-              <a:rPr lang="de-DE" dirty="0"/>
+          <a:bodyPr>
+            <a:normAutofit/>
+          </a:bodyPr>
+          <a:lstStyle/>
+          <a:p>
+            <a:r>
+              <a:rPr lang="de-DE" sz="4200" dirty="0"/>
               <a:t>Struktur - Landesgesundheitsamt</a:t>
             </a:r>
           </a:p>
@@ -6938,11 +7441,13 @@
         </p:nvSpPr>
         <p:spPr/>
         <p:txBody>
-          <a:bodyPr/>
-          <a:lstStyle/>
-          <a:p>
-            <a:r>
-              <a:rPr lang="de-DE" dirty="0"/>
+          <a:bodyPr>
+            <a:normAutofit/>
+          </a:bodyPr>
+          <a:lstStyle/>
+          <a:p>
+            <a:r>
+              <a:rPr lang="de-DE" sz="4200" dirty="0"/>
               <a:t>Struktur - Landesgesundheitsamt</a:t>
             </a:r>
           </a:p>
@@ -7073,7 +7578,7 @@
         <p:spPr/>
         <p:txBody>
           <a:bodyPr>
-            <a:normAutofit fontScale="90000"/>
+            <a:noAutofit/>
           </a:bodyPr>
           <a:lstStyle/>
           <a:p>
@@ -7165,6 +7670,13 @@
   <p:clrMapOvr>
     <a:masterClrMapping/>
   </p:clrMapOvr>
+  <p:timing>
+    <p:tnLst>
+      <p:par>
+        <p:cTn id="1" dur="indefinite" restart="never" nodeType="tmRoot"/>
+      </p:par>
+    </p:tnLst>
+  </p:timing>
 </p:sld>
 </file>
 
@@ -7197,10 +7709,16 @@
         </p:nvSpPr>
         <p:spPr/>
         <p:txBody>
-          <a:bodyPr/>
-          <a:lstStyle/>
-          <a:p>
-            <a:endParaRPr lang="de-DE"/>
+          <a:bodyPr>
+            <a:normAutofit/>
+          </a:bodyPr>
+          <a:lstStyle/>
+          <a:p>
+            <a:r>
+              <a:rPr lang="de-DE" sz="4200" dirty="0" smtClean="0"/>
+              <a:t>Aufgaben - Landesgesundheitsamt</a:t>
+            </a:r>
+            <a:endParaRPr lang="de-DE" sz="4200" dirty="0"/>
           </a:p>
         </p:txBody>
       </p:sp>
@@ -7216,10 +7734,45 @@
         </p:nvSpPr>
         <p:spPr/>
         <p:txBody>
-          <a:bodyPr/>
-          <a:lstStyle/>
-          <a:p>
-            <a:endParaRPr lang="de-DE"/>
+          <a:bodyPr>
+            <a:normAutofit/>
+          </a:bodyPr>
+          <a:lstStyle/>
+          <a:p>
+            <a:pPr marL="342900" lvl="1" indent="-342900"/>
+            <a:r>
+              <a:rPr lang="de-DE" sz="2800" dirty="0"/>
+              <a:t>Beratung </a:t>
+            </a:r>
+            <a:r>
+              <a:rPr lang="de-DE" sz="2800" dirty="0" smtClean="0"/>
+              <a:t> von Landesministerien</a:t>
+            </a:r>
+            <a:r>
+              <a:rPr lang="de-DE" sz="2800" dirty="0"/>
+              <a:t>, Behörden und Institutionen in Fragen des öffentlichen Gesundheitswesens</a:t>
+            </a:r>
+          </a:p>
+          <a:p>
+            <a:pPr marL="342900" lvl="1" indent="-342900"/>
+            <a:r>
+              <a:rPr lang="de-DE" sz="2800" dirty="0" smtClean="0"/>
+              <a:t>Aufgaben </a:t>
+            </a:r>
+            <a:r>
+              <a:rPr lang="de-DE" sz="2800" dirty="0"/>
+              <a:t>des Landesarztes für behinderte Menschen</a:t>
+            </a:r>
+          </a:p>
+          <a:p>
+            <a:pPr marL="342900" lvl="1" indent="-342900"/>
+            <a:r>
+              <a:rPr lang="de-DE" sz="2800" dirty="0"/>
+              <a:t>Unterstützung der Gewerbeaufsicht in der Funktion des Staatlichen Gewerbearztes</a:t>
+            </a:r>
+          </a:p>
+          <a:p>
+            <a:endParaRPr lang="de-DE" sz="2800" dirty="0"/>
           </a:p>
         </p:txBody>
       </p:sp>
@@ -7256,6 +7809,13 @@
   <p:clrMapOvr>
     <a:masterClrMapping/>
   </p:clrMapOvr>
+  <p:timing>
+    <p:tnLst>
+      <p:par>
+        <p:cTn id="1" dur="indefinite" restart="never" nodeType="tmRoot"/>
+      </p:par>
+    </p:tnLst>
+  </p:timing>
 </p:sld>
 </file>
 

</xml_diff>